<commit_message>
update PPT and sprints
</commit_message>
<xml_diff>
--- a/documents/second_presentation.pptx
+++ b/documents/second_presentation.pptx
@@ -6221,15 +6221,7 @@
             </a:r>
             <a:r>
               <a:rPr lang="en-US" dirty="0" smtClean="0"/>
-              <a:t>have a reasonable process for agents in different regions. Secondly, </a:t>
-            </a:r>
-            <a:r>
-              <a:rPr lang="en-US" dirty="0" smtClean="0"/>
-              <a:t>we need to improve our velocity. </a:t>
-            </a:r>
-            <a:r>
-              <a:rPr lang="en-US" dirty="0" smtClean="0"/>
-              <a:t>Thirdly, </a:t>
+              <a:t>have a reasonable process for agents in different regions. Secondly, we need to improve our velocity. Thirdly, </a:t>
             </a:r>
             <a:r>
               <a:rPr lang="en-US" dirty="0"/>
@@ -6275,11 +6267,7 @@
             </a:r>
             <a:r>
               <a:rPr lang="en-US" altLang="zh-CN" dirty="0" smtClean="0"/>
-              <a:t>Documents. </a:t>
-            </a:r>
-            <a:r>
-              <a:rPr lang="en-US" altLang="zh-CN" dirty="0" smtClean="0"/>
-              <a:t>Firstly, divide </a:t>
+              <a:t>Documents. Firstly, divide </a:t>
             </a:r>
             <a:r>
               <a:rPr lang="en-US" altLang="zh-CN" dirty="0"/>
@@ -6295,11 +6283,7 @@
             </a:r>
             <a:r>
               <a:rPr lang="en-US" altLang="zh-CN" dirty="0" smtClean="0"/>
-              <a:t>schedule. </a:t>
-            </a:r>
-            <a:r>
-              <a:rPr lang="en-US" altLang="zh-CN" dirty="0" smtClean="0"/>
-              <a:t>Secondly, don</a:t>
+              <a:t>schedule. Secondly, don</a:t>
             </a:r>
             <a:r>
               <a:rPr lang="mr-IN" altLang="zh-CN" dirty="0" smtClean="0"/>
@@ -6307,19 +6291,7 @@
             </a:r>
             <a:r>
               <a:rPr lang="en-US" altLang="zh-CN" dirty="0" smtClean="0"/>
-              <a:t>t forget to update the sprint tasks table to track our progress. Thirdly, think about </a:t>
-            </a:r>
-            <a:r>
-              <a:rPr lang="en-US" altLang="zh-CN" dirty="0" smtClean="0"/>
-              <a:t>what kind of test </a:t>
-            </a:r>
-            <a:r>
-              <a:rPr lang="en-US" altLang="zh-CN" dirty="0" smtClean="0"/>
-              <a:t>cases </a:t>
-            </a:r>
-            <a:r>
-              <a:rPr lang="en-US" altLang="zh-CN" dirty="0" smtClean="0"/>
-              <a:t>is necessary before writing the test case.</a:t>
+              <a:t>t forget to update the sprint tasks table to track our progress. Thirdly, think about what kind of test cases is necessary before writing the test case.</a:t>
             </a:r>
             <a:endParaRPr lang="en-US" altLang="zh-CN" dirty="0"/>
           </a:p>
@@ -6453,13 +6425,8 @@
           <a:p>
             <a:r>
               <a:rPr lang="en-US" dirty="0" smtClean="0"/>
-              <a:t>To improve the equal </a:t>
-            </a:r>
-            <a:r>
-              <a:rPr lang="en-US" dirty="0" smtClean="0"/>
-              <a:t>participation</a:t>
-            </a:r>
-            <a:endParaRPr lang="en-US" dirty="0" smtClean="0"/>
+              <a:t>To improve the equal participation</a:t>
+            </a:r>
           </a:p>
           <a:p>
             <a:r>
@@ -6512,23 +6479,11 @@
           <a:p>
             <a:r>
               <a:rPr lang="en-US" dirty="0" smtClean="0"/>
-              <a:t>To </a:t>
-            </a:r>
-            <a:r>
-              <a:rPr lang="en-US" dirty="0" smtClean="0"/>
-              <a:t>design </a:t>
+              <a:t>To design </a:t>
             </a:r>
             <a:r>
               <a:rPr lang="en-US" altLang="zh-CN" dirty="0" smtClean="0"/>
-              <a:t>effective test </a:t>
-            </a:r>
-            <a:r>
-              <a:rPr lang="en-US" altLang="zh-CN" dirty="0" smtClean="0"/>
-              <a:t>cases, </a:t>
-            </a:r>
-            <a:r>
-              <a:rPr lang="en-US" altLang="zh-CN" dirty="0" smtClean="0"/>
-              <a:t>so that we can valid the </a:t>
+              <a:t>effective test cases, so that we can valid the </a:t>
             </a:r>
             <a:r>
               <a:rPr lang="en-US" altLang="zh-CN" dirty="0"/>
@@ -6820,7 +6775,15 @@
           <a:p>
             <a:r>
               <a:rPr lang="en-US" dirty="0"/>
-              <a:t>Develop GUI to show the node part of the graphical view </a:t>
+              <a:t>Develop GUI to show the </a:t>
+            </a:r>
+            <a:r>
+              <a:rPr lang="en-US" dirty="0" smtClean="0"/>
+              <a:t>graphical </a:t>
+            </a:r>
+            <a:r>
+              <a:rPr lang="en-US" dirty="0"/>
+              <a:t>view </a:t>
             </a:r>
             <a:r>
               <a:rPr lang="en-US" dirty="0" smtClean="0"/>
@@ -6834,25 +6797,7 @@
               <a:rPr lang="en-US" dirty="0" smtClean="0"/>
               <a:t>)</a:t>
             </a:r>
-          </a:p>
-          <a:p>
-            <a:r>
-              <a:rPr lang="en-US" dirty="0"/>
-              <a:t>Develop GUI to show the edge part of graphical view </a:t>
-            </a:r>
-            <a:r>
-              <a:rPr lang="en-US" dirty="0" smtClean="0"/>
-              <a:t>(</a:t>
-            </a:r>
-            <a:r>
-              <a:rPr lang="en-US" dirty="0" err="1" smtClean="0"/>
-              <a:t>chaohui</a:t>
-            </a:r>
-            <a:r>
-              <a:rPr lang="en-US" dirty="0" smtClean="0"/>
-              <a:t>)</a:t>
-            </a:r>
-            <a:endParaRPr lang="en-US" dirty="0"/>
+            <a:endParaRPr lang="en-US" dirty="0" smtClean="0"/>
           </a:p>
         </p:txBody>
       </p:sp>
@@ -6976,25 +6921,7 @@
               <a:rPr lang="en-US" dirty="0" smtClean="0"/>
               <a:t>)</a:t>
             </a:r>
-          </a:p>
-          <a:p>
-            <a:r>
-              <a:rPr lang="en-US" dirty="0"/>
-              <a:t>Develop GUI to show the block view according the configuration file </a:t>
-            </a:r>
-            <a:r>
-              <a:rPr lang="en-US" dirty="0" smtClean="0"/>
-              <a:t>(</a:t>
-            </a:r>
-            <a:r>
-              <a:rPr lang="en-US" dirty="0"/>
-              <a:t>Sheng Zhang </a:t>
-            </a:r>
-            <a:r>
-              <a:rPr lang="en-US" dirty="0" smtClean="0"/>
-              <a:t>)</a:t>
-            </a:r>
-            <a:endParaRPr lang="en-US" dirty="0"/>
+            <a:endParaRPr lang="en-US" dirty="0" smtClean="0"/>
           </a:p>
         </p:txBody>
       </p:sp>
@@ -7074,7 +7001,7 @@
         </p:spPr>
         <p:txBody>
           <a:bodyPr>
-            <a:normAutofit fontScale="92500" lnSpcReduction="10000"/>
+            <a:normAutofit/>
           </a:bodyPr>
           <a:lstStyle/>
           <a:p>
@@ -7110,45 +7037,18 @@
             </a:r>
             <a:r>
               <a:rPr lang="en-US" dirty="0" smtClean="0"/>
-              <a:t>Zhang)</a:t>
-            </a:r>
-          </a:p>
-          <a:p>
-            <a:r>
-              <a:rPr lang="en-US" dirty="0"/>
-              <a:t>Run the algorithm step by step </a:t>
+              <a:t>Zhang</a:t>
             </a:r>
             <a:r>
               <a:rPr lang="en-US" dirty="0" smtClean="0"/>
-              <a:t>(Sheng Zhang)</a:t>
-            </a:r>
-          </a:p>
-          <a:p>
-            <a:r>
-              <a:rPr lang="en-US" dirty="0"/>
-              <a:t>Run the algorithm for a fixed number of step </a:t>
-            </a:r>
+              <a:t>)</a:t>
+            </a:r>
+            <a:endParaRPr lang="en-US" dirty="0" smtClean="0"/>
+          </a:p>
+          <a:p>
             <a:r>
               <a:rPr lang="en-US" dirty="0" smtClean="0"/>
-              <a:t>(</a:t>
-            </a:r>
-            <a:r>
-              <a:rPr lang="en-US" dirty="0"/>
-              <a:t>Sheng </a:t>
-            </a:r>
-            <a:r>
-              <a:rPr lang="en-US" dirty="0" smtClean="0"/>
-              <a:t>Zhang)</a:t>
-            </a:r>
-          </a:p>
-          <a:p>
-            <a:r>
-              <a:rPr lang="en-US" dirty="0"/>
-              <a:t>Develop GUI to show the status of each step execution of the algorithm </a:t>
-            </a:r>
-            <a:r>
-              <a:rPr lang="en-US" dirty="0" smtClean="0"/>
-              <a:t>(</a:t>
+              <a:t>Develop GUI to show the status of each step execution of the algorithm (</a:t>
             </a:r>
             <a:r>
               <a:rPr lang="en-US" dirty="0" err="1" smtClean="0"/>
@@ -7161,12 +7061,8 @@
           </a:p>
           <a:p>
             <a:r>
-              <a:rPr lang="en-US" dirty="0"/>
-              <a:t>Develop the GUI portion of block view to show the status of a fixed steps execution of the algorithm </a:t>
-            </a:r>
-            <a:r>
               <a:rPr lang="en-US" dirty="0" smtClean="0"/>
-              <a:t>(</a:t>
+              <a:t>Develop the GUI portion of block view to show the status of a fixed steps execution of the algorithm (</a:t>
             </a:r>
             <a:r>
               <a:rPr lang="en-US" dirty="0" err="1" smtClean="0"/>
@@ -7179,8 +7075,12 @@
           </a:p>
           <a:p>
             <a:r>
+              <a:rPr lang="en-US" dirty="0" smtClean="0"/>
+              <a:t>Develop </a:t>
+            </a:r>
+            <a:r>
               <a:rPr lang="en-US" dirty="0"/>
-              <a:t>Develop the GUI portion of block view provide options for user to choose run the algorithm step by step or execute the algorithm for a fixed number of times/steps </a:t>
+              <a:t>the GUI portion of block view provide options for user to choose run the algorithm step by step or execute the algorithm for a fixed number of times/steps </a:t>
             </a:r>
             <a:r>
               <a:rPr lang="en-US" dirty="0" smtClean="0"/>

</xml_diff>